<commit_message>
Update app icon, fix security vulnerability in fresh
</commit_message>
<xml_diff>
--- a/documents/Suunta_JunaReitti_Liikennevirasto-2018-05-03.pptx
+++ b/documents/Suunta_JunaReitti_Liikennevirasto-2018-05-03.pptx
@@ -6,10 +6,11 @@
   </p:sldMasterIdLst>
   <p:sldIdLst>
     <p:sldId id="256" r:id="rId2"/>
-    <p:sldId id="261" r:id="rId3"/>
-    <p:sldId id="265" r:id="rId4"/>
-    <p:sldId id="263" r:id="rId5"/>
-    <p:sldId id="260" r:id="rId6"/>
+    <p:sldId id="257" r:id="rId3"/>
+    <p:sldId id="261" r:id="rId4"/>
+    <p:sldId id="265" r:id="rId5"/>
+    <p:sldId id="263" r:id="rId6"/>
+    <p:sldId id="260" r:id="rId7"/>
   </p:sldIdLst>
   <p:sldSz cx="12192000" cy="6858000"/>
   <p:notesSz cx="6858000" cy="9144000"/>
@@ -342,7 +343,7 @@
           <a:p>
             <a:fld id="{96DFF08F-DC6B-4601-B491-B0F83F6DD2DA}" type="datetimeFigureOut">
               <a:rPr lang="en-US" dirty="0"/>
-              <a:t>5/3/2018</a:t>
+              <a:t>5/8/2018</a:t>
             </a:fld>
             <a:endParaRPr lang="en-US" dirty="0"/>
           </a:p>
@@ -545,7 +546,7 @@
           <a:p>
             <a:fld id="{96DFF08F-DC6B-4601-B491-B0F83F6DD2DA}" type="datetimeFigureOut">
               <a:rPr lang="en-US" dirty="0"/>
-              <a:t>5/3/2018</a:t>
+              <a:t>5/8/2018</a:t>
             </a:fld>
             <a:endParaRPr lang="en-US" dirty="0"/>
           </a:p>
@@ -796,7 +797,7 @@
           <a:p>
             <a:fld id="{96DFF08F-DC6B-4601-B491-B0F83F6DD2DA}" type="datetimeFigureOut">
               <a:rPr lang="en-US" dirty="0"/>
-              <a:t>5/3/2018</a:t>
+              <a:t>5/8/2018</a:t>
             </a:fld>
             <a:endParaRPr lang="en-US" dirty="0"/>
           </a:p>
@@ -983,7 +984,7 @@
           <a:p>
             <a:fld id="{D62CEF3B-A037-46D0-B02C-1428F07E9383}" type="datetimeFigureOut">
               <a:rPr lang="en-US" dirty="0"/>
-              <a:t>5/3/2018</a:t>
+              <a:t>5/8/2018</a:t>
             </a:fld>
             <a:endParaRPr lang="en-US" dirty="0"/>
           </a:p>
@@ -1321,7 +1322,7 @@
           <a:p>
             <a:fld id="{96DFF08F-DC6B-4601-B491-B0F83F6DD2DA}" type="datetimeFigureOut">
               <a:rPr lang="en-US" dirty="0"/>
-              <a:t>5/3/2018</a:t>
+              <a:t>5/8/2018</a:t>
             </a:fld>
             <a:endParaRPr lang="en-US" dirty="0"/>
           </a:p>
@@ -1591,7 +1592,7 @@
           <a:p>
             <a:fld id="{96DFF08F-DC6B-4601-B491-B0F83F6DD2DA}" type="datetimeFigureOut">
               <a:rPr lang="en-US" dirty="0"/>
-              <a:t>5/3/2018</a:t>
+              <a:t>5/8/2018</a:t>
             </a:fld>
             <a:endParaRPr lang="en-US" dirty="0"/>
           </a:p>
@@ -1965,7 +1966,7 @@
           <a:p>
             <a:fld id="{96DFF08F-DC6B-4601-B491-B0F83F6DD2DA}" type="datetimeFigureOut">
               <a:rPr lang="en-US" dirty="0"/>
-              <a:t>5/3/2018</a:t>
+              <a:t>5/8/2018</a:t>
             </a:fld>
             <a:endParaRPr lang="en-US" dirty="0"/>
           </a:p>
@@ -2078,7 +2079,7 @@
           <a:p>
             <a:fld id="{96DFF08F-DC6B-4601-B491-B0F83F6DD2DA}" type="datetimeFigureOut">
               <a:rPr lang="en-US" dirty="0"/>
-              <a:t>5/3/2018</a:t>
+              <a:t>5/8/2018</a:t>
             </a:fld>
             <a:endParaRPr lang="en-US" dirty="0"/>
           </a:p>
@@ -2245,7 +2246,7 @@
             <a:fld id="{96DFF08F-DC6B-4601-B491-B0F83F6DD2DA}" type="datetimeFigureOut">
               <a:rPr lang="en-US" dirty="0"/>
               <a:pPr/>
-              <a:t>5/3/2018</a:t>
+              <a:t>5/8/2018</a:t>
             </a:fld>
             <a:endParaRPr lang="en-US" dirty="0"/>
           </a:p>
@@ -2596,7 +2597,7 @@
             <a:fld id="{96DFF08F-DC6B-4601-B491-B0F83F6DD2DA}" type="datetimeFigureOut">
               <a:rPr lang="en-US" dirty="0"/>
               <a:pPr/>
-              <a:t>5/3/2018</a:t>
+              <a:t>5/8/2018</a:t>
             </a:fld>
             <a:endParaRPr lang="en-US" dirty="0"/>
           </a:p>
@@ -2969,7 +2970,7 @@
           <a:p>
             <a:fld id="{96DFF08F-DC6B-4601-B491-B0F83F6DD2DA}" type="datetimeFigureOut">
               <a:rPr lang="en-US" dirty="0"/>
-              <a:t>5/3/2018</a:t>
+              <a:t>5/8/2018</a:t>
             </a:fld>
             <a:endParaRPr lang="en-US" dirty="0"/>
           </a:p>
@@ -3252,7 +3253,7 @@
             <a:fld id="{96DFF08F-DC6B-4601-B491-B0F83F6DD2DA}" type="datetimeFigureOut">
               <a:rPr lang="en-US" dirty="0"/>
               <a:pPr/>
-              <a:t>5/3/2018</a:t>
+              <a:t>5/8/2018</a:t>
             </a:fld>
             <a:endParaRPr lang="en-US" dirty="0"/>
           </a:p>
@@ -3794,10 +3795,9 @@
           <a:lstStyle/>
           <a:p>
             <a:r>
-              <a:rPr lang="fi-FI" dirty="0" err="1"/>
+              <a:rPr lang="fi-FI" dirty="0"/>
               <a:t>JunaReitti</a:t>
             </a:r>
-            <a:endParaRPr lang="fi-FI" dirty="0"/>
           </a:p>
         </p:txBody>
       </p:sp>
@@ -3830,7 +3830,7 @@
           <a:p>
             <a:r>
               <a:rPr lang="fi-FI" dirty="0"/>
-              <a:t>3.5.2018</a:t>
+              <a:t>8.5.2018</a:t>
             </a:r>
           </a:p>
         </p:txBody>
@@ -3867,10 +3867,10 @@
       </p:grpSpPr>
       <p:sp>
         <p:nvSpPr>
-          <p:cNvPr id="2" name="Title 1">
+          <p:cNvPr id="2" name="Otsikko 1">
             <a:extLst>
               <a:ext uri="{FF2B5EF4-FFF2-40B4-BE49-F238E27FC236}">
-                <a16:creationId xmlns:a16="http://schemas.microsoft.com/office/drawing/2014/main" id="{9C5868B4-A4CB-4EF0-A82C-683C3A41CEA8}"/>
+                <a16:creationId xmlns:a16="http://schemas.microsoft.com/office/drawing/2014/main" id="{E99E9544-C304-44E8-8680-B31FEB4FD82E}"/>
               </a:ext>
             </a:extLst>
           </p:cNvPr>
@@ -3887,19 +3887,18 @@
           <a:lstStyle/>
           <a:p>
             <a:r>
-              <a:rPr lang="en-GB" dirty="0" err="1"/>
-              <a:t>Suunnitelma</a:t>
-            </a:r>
-            <a:endParaRPr lang="en-GB" dirty="0"/>
-          </a:p>
-        </p:txBody>
-      </p:sp>
-      <p:sp>
-        <p:nvSpPr>
-          <p:cNvPr id="3" name="Text Placeholder 2">
+              <a:rPr lang="fi-FI" dirty="0"/>
+              <a:t>Lähtökohta</a:t>
+            </a:r>
+          </a:p>
+        </p:txBody>
+      </p:sp>
+      <p:sp>
+        <p:nvSpPr>
+          <p:cNvPr id="3" name="Sisällön paikkamerkki 2">
             <a:extLst>
               <a:ext uri="{FF2B5EF4-FFF2-40B4-BE49-F238E27FC236}">
-                <a16:creationId xmlns:a16="http://schemas.microsoft.com/office/drawing/2014/main" id="{F896C31A-F56E-438A-A993-8DCF0B57016A}"/>
+                <a16:creationId xmlns:a16="http://schemas.microsoft.com/office/drawing/2014/main" id="{676FC8ED-6AD5-4A68-8D4F-4C6D5ABC0C0D}"/>
               </a:ext>
             </a:extLst>
           </p:cNvPr>
@@ -3907,176 +3906,95 @@
             <a:spLocks noGrp="1"/>
           </p:cNvSpPr>
           <p:nvPr>
-            <p:ph type="body" idx="1"/>
-          </p:nvPr>
-        </p:nvSpPr>
-        <p:spPr/>
-        <p:txBody>
-          <a:bodyPr/>
-          <a:lstStyle/>
-          <a:p>
-            <a:r>
-              <a:rPr lang="en-GB" dirty="0" err="1"/>
-              <a:t>minimivaatimukset</a:t>
-            </a:r>
-            <a:endParaRPr lang="en-GB" dirty="0"/>
-          </a:p>
-        </p:txBody>
-      </p:sp>
-      <p:sp>
-        <p:nvSpPr>
-          <p:cNvPr id="4" name="Content Placeholder 3">
+            <p:ph idx="1"/>
+          </p:nvPr>
+        </p:nvSpPr>
+        <p:spPr>
+          <a:xfrm>
+            <a:off x="1097280" y="1845734"/>
+            <a:ext cx="6480387" cy="4023360"/>
+          </a:xfrm>
+        </p:spPr>
+        <p:txBody>
+          <a:bodyPr/>
+          <a:lstStyle/>
+          <a:p>
+            <a:pPr>
+              <a:buFont typeface="Arial" panose="020B0604020202020204" pitchFamily="34" charset="0"/>
+              <a:buChar char="•"/>
+            </a:pPr>
+            <a:r>
+              <a:rPr lang="fi-FI" dirty="0"/>
+              <a:t>Aikatauluhaku kahden juna-aseman välille</a:t>
+            </a:r>
+          </a:p>
+          <a:p>
+            <a:pPr>
+              <a:buFont typeface="Arial" panose="020B0604020202020204" pitchFamily="34" charset="0"/>
+              <a:buChar char="•"/>
+            </a:pPr>
+            <a:endParaRPr lang="fi-FI" dirty="0"/>
+          </a:p>
+          <a:p>
+            <a:pPr>
+              <a:buFont typeface="Arial" panose="020B0604020202020204" pitchFamily="34" charset="0"/>
+              <a:buChar char="•"/>
+            </a:pPr>
+            <a:r>
+              <a:rPr lang="fi-FI" dirty="0"/>
+              <a:t>Inspiraatio Junat.net-sivusta</a:t>
+            </a:r>
+          </a:p>
+          <a:p>
+            <a:pPr>
+              <a:buFont typeface="Arial" panose="020B0604020202020204" pitchFamily="34" charset="0"/>
+              <a:buChar char="•"/>
+            </a:pPr>
+            <a:endParaRPr lang="fi-FI" dirty="0"/>
+          </a:p>
+          <a:p>
+            <a:pPr>
+              <a:buFont typeface="Arial" panose="020B0604020202020204" pitchFamily="34" charset="0"/>
+              <a:buChar char="•"/>
+            </a:pPr>
+            <a:endParaRPr lang="fi-FI" dirty="0"/>
+          </a:p>
+        </p:txBody>
+      </p:sp>
+      <p:pic>
+        <p:nvPicPr>
+          <p:cNvPr id="4" name="Kuva 3">
             <a:extLst>
               <a:ext uri="{FF2B5EF4-FFF2-40B4-BE49-F238E27FC236}">
-                <a16:creationId xmlns:a16="http://schemas.microsoft.com/office/drawing/2014/main" id="{D46857C2-020A-48BC-8EF0-26E42DF26172}"/>
+                <a16:creationId xmlns:a16="http://schemas.microsoft.com/office/drawing/2014/main" id="{4B056B8C-A6C6-4C11-8E3B-22417DD60A91}"/>
               </a:ext>
             </a:extLst>
           </p:cNvPr>
-          <p:cNvSpPr>
-            <a:spLocks noGrp="1"/>
-          </p:cNvSpPr>
-          <p:nvPr>
-            <p:ph sz="half" idx="2"/>
-          </p:nvPr>
-        </p:nvSpPr>
-        <p:spPr/>
-        <p:txBody>
-          <a:bodyPr/>
-          <a:lstStyle/>
-          <a:p>
-            <a:pPr>
-              <a:buFont typeface="Wingdings" panose="05000000000000000000" pitchFamily="2" charset="2"/>
-              <a:buChar char="ü"/>
-            </a:pPr>
-            <a:r>
-              <a:rPr lang="fi-FI" dirty="0"/>
-              <a:t> Asemien haku Liikenneviraston rajapinnasta</a:t>
-            </a:r>
-          </a:p>
-          <a:p>
-            <a:pPr>
-              <a:buFont typeface="Wingdings" panose="05000000000000000000" pitchFamily="2" charset="2"/>
-              <a:buChar char="ü"/>
-            </a:pPr>
-            <a:r>
-              <a:rPr lang="fi-FI" dirty="0"/>
-              <a:t> Aikatauluhaku rajapinnasta</a:t>
-            </a:r>
-          </a:p>
-          <a:p>
-            <a:pPr>
-              <a:buFont typeface="Wingdings" panose="05000000000000000000" pitchFamily="2" charset="2"/>
-              <a:buChar char="ü"/>
-            </a:pPr>
-            <a:r>
-              <a:rPr lang="fi-FI" dirty="0"/>
-              <a:t> Tietojen esitys taulukossa</a:t>
-            </a:r>
-          </a:p>
-          <a:p>
-            <a:pPr>
-              <a:buFont typeface="Wingdings" panose="05000000000000000000" pitchFamily="2" charset="2"/>
-              <a:buChar char="ü"/>
-            </a:pPr>
-            <a:endParaRPr lang="fi-FI" dirty="0"/>
-          </a:p>
-        </p:txBody>
-      </p:sp>
-      <p:sp>
-        <p:nvSpPr>
-          <p:cNvPr id="5" name="Text Placeholder 4">
-            <a:extLst>
-              <a:ext uri="{FF2B5EF4-FFF2-40B4-BE49-F238E27FC236}">
-                <a16:creationId xmlns:a16="http://schemas.microsoft.com/office/drawing/2014/main" id="{18AA7F29-44D2-41FC-9D1D-B31C139502FD}"/>
-              </a:ext>
-            </a:extLst>
-          </p:cNvPr>
-          <p:cNvSpPr>
-            <a:spLocks noGrp="1"/>
-          </p:cNvSpPr>
-          <p:nvPr>
-            <p:ph type="body" sz="quarter" idx="3"/>
-          </p:nvPr>
-        </p:nvSpPr>
-        <p:spPr/>
-        <p:txBody>
-          <a:bodyPr/>
-          <a:lstStyle/>
-          <a:p>
-            <a:r>
-              <a:rPr lang="en-GB" dirty="0" err="1"/>
-              <a:t>Toivelista</a:t>
-            </a:r>
-            <a:endParaRPr lang="en-GB" dirty="0"/>
-          </a:p>
-        </p:txBody>
-      </p:sp>
-      <p:sp>
-        <p:nvSpPr>
-          <p:cNvPr id="6" name="Content Placeholder 5">
-            <a:extLst>
-              <a:ext uri="{FF2B5EF4-FFF2-40B4-BE49-F238E27FC236}">
-                <a16:creationId xmlns:a16="http://schemas.microsoft.com/office/drawing/2014/main" id="{6C9AE70D-03BB-4FD9-94F4-A7D4F5197EA0}"/>
-              </a:ext>
-            </a:extLst>
-          </p:cNvPr>
-          <p:cNvSpPr>
-            <a:spLocks noGrp="1"/>
-          </p:cNvSpPr>
-          <p:nvPr>
-            <p:ph sz="quarter" idx="4"/>
-          </p:nvPr>
-        </p:nvSpPr>
-        <p:spPr/>
-        <p:txBody>
-          <a:bodyPr/>
-          <a:lstStyle/>
-          <a:p>
-            <a:pPr>
-              <a:buFont typeface="Wingdings" panose="05000000000000000000" pitchFamily="2" charset="2"/>
-              <a:buChar char="ü"/>
-            </a:pPr>
-            <a:r>
-              <a:rPr lang="fi-FI" dirty="0"/>
-              <a:t> Aikataulumuutosten esitys</a:t>
-            </a:r>
-          </a:p>
-          <a:p>
-            <a:pPr>
-              <a:buFont typeface="Wingdings" panose="05000000000000000000" pitchFamily="2" charset="2"/>
-              <a:buChar char="ü"/>
-            </a:pPr>
-            <a:r>
-              <a:rPr lang="fi-FI" dirty="0"/>
-              <a:t> Sovellus ehdottaa asema-kenttiin asemia (autocomplete)</a:t>
-            </a:r>
-          </a:p>
-          <a:p>
-            <a:pPr>
-              <a:buFont typeface="Wingdings" panose="05000000000000000000" pitchFamily="2" charset="2"/>
-              <a:buChar char="ü"/>
-            </a:pPr>
-            <a:r>
-              <a:rPr lang="fi-FI" dirty="0"/>
-              <a:t> Lähimmän aseman haku GPS-paikannuksella</a:t>
-            </a:r>
-          </a:p>
-          <a:p>
-            <a:pPr>
-              <a:buFont typeface="Wingdings" panose="05000000000000000000" pitchFamily="2" charset="2"/>
-              <a:buChar char="q"/>
-            </a:pPr>
-            <a:r>
-              <a:rPr lang="fi-FI" dirty="0"/>
-              <a:t> Omien reittien tallentaminen</a:t>
-            </a:r>
-          </a:p>
-        </p:txBody>
-      </p:sp>
+          <p:cNvPicPr>
+            <a:picLocks noChangeAspect="1"/>
+          </p:cNvPicPr>
+          <p:nvPr/>
+        </p:nvPicPr>
+        <p:blipFill>
+          <a:blip r:embed="rId2"/>
+          <a:stretch>
+            <a:fillRect/>
+          </a:stretch>
+        </p:blipFill>
+        <p:spPr>
+          <a:xfrm>
+            <a:off x="9017000" y="1938867"/>
+            <a:ext cx="2005489" cy="4084213"/>
+          </a:xfrm>
+          <a:prstGeom prst="rect">
+            <a:avLst/>
+          </a:prstGeom>
+        </p:spPr>
+      </p:pic>
     </p:spTree>
     <p:extLst>
       <p:ext uri="{BB962C8B-B14F-4D97-AF65-F5344CB8AC3E}">
-        <p14:creationId xmlns:p14="http://schemas.microsoft.com/office/powerpoint/2010/main" val="666523930"/>
+        <p14:creationId xmlns:p14="http://schemas.microsoft.com/office/powerpoint/2010/main" val="1392548046"/>
       </p:ext>
     </p:extLst>
   </p:cSld>
@@ -4108,7 +4026,7 @@
           <p:cNvPr id="2" name="Title 1">
             <a:extLst>
               <a:ext uri="{FF2B5EF4-FFF2-40B4-BE49-F238E27FC236}">
-                <a16:creationId xmlns:a16="http://schemas.microsoft.com/office/drawing/2014/main" id="{AD10D188-D805-4295-AAE2-3C6E1011C4D8}"/>
+                <a16:creationId xmlns:a16="http://schemas.microsoft.com/office/drawing/2014/main" id="{9C5868B4-A4CB-4EF0-A82C-683C3A41CEA8}"/>
               </a:ext>
             </a:extLst>
           </p:cNvPr>
@@ -4126,7 +4044,7 @@
           <a:p>
             <a:r>
               <a:rPr lang="en-GB" dirty="0" err="1"/>
-              <a:t>Työvaiheet</a:t>
+              <a:t>Suunnitelma</a:t>
             </a:r>
             <a:endParaRPr lang="en-GB" dirty="0"/>
           </a:p>
@@ -4137,7 +4055,7 @@
           <p:cNvPr id="3" name="Text Placeholder 2">
             <a:extLst>
               <a:ext uri="{FF2B5EF4-FFF2-40B4-BE49-F238E27FC236}">
-                <a16:creationId xmlns:a16="http://schemas.microsoft.com/office/drawing/2014/main" id="{CAB03B0F-B9D2-4EF3-AFBB-D36EDE59760C}"/>
+                <a16:creationId xmlns:a16="http://schemas.microsoft.com/office/drawing/2014/main" id="{F896C31A-F56E-438A-A993-8DCF0B57016A}"/>
               </a:ext>
             </a:extLst>
           </p:cNvPr>
@@ -4154,10 +4072,10 @@
           <a:lstStyle/>
           <a:p>
             <a:r>
-              <a:rPr lang="en-GB" dirty="0" err="1"/>
-              <a:t>suunnittelu</a:t>
-            </a:r>
-            <a:endParaRPr lang="en-GB" dirty="0"/>
+              <a:rPr lang="en-GB" sz="2400" b="1" cap="none" dirty="0" err="1"/>
+              <a:t>Minimivaatimukset</a:t>
+            </a:r>
+            <a:endParaRPr lang="en-GB" b="1" dirty="0"/>
           </a:p>
         </p:txBody>
       </p:sp>
@@ -4166,7 +4084,7 @@
           <p:cNvPr id="4" name="Content Placeholder 3">
             <a:extLst>
               <a:ext uri="{FF2B5EF4-FFF2-40B4-BE49-F238E27FC236}">
-                <a16:creationId xmlns:a16="http://schemas.microsoft.com/office/drawing/2014/main" id="{AF72CB90-AB65-4805-8399-DB3AF7D65BFF}"/>
+                <a16:creationId xmlns:a16="http://schemas.microsoft.com/office/drawing/2014/main" id="{D46857C2-020A-48BC-8EF0-26E42DF26172}"/>
               </a:ext>
             </a:extLst>
           </p:cNvPr>
@@ -4179,47 +4097,46 @@
         </p:nvSpPr>
         <p:spPr/>
         <p:txBody>
-          <a:bodyPr/>
+          <a:bodyPr>
+            <a:normAutofit lnSpcReduction="10000"/>
+          </a:bodyPr>
           <a:lstStyle/>
           <a:p>
             <a:pPr>
-              <a:buFont typeface="Arial" panose="020B0604020202020204" pitchFamily="34" charset="0"/>
-              <a:buChar char="•"/>
+              <a:buFont typeface="Wingdings" panose="05000000000000000000" pitchFamily="2" charset="2"/>
+              <a:buChar char="ü"/>
             </a:pPr>
             <a:r>
-              <a:rPr lang="en-GB" dirty="0"/>
-              <a:t> MVP</a:t>
+              <a:rPr lang="fi-FI" dirty="0"/>
+              <a:t> Asemien haku Liikenneviraston rajapinnasta</a:t>
             </a:r>
           </a:p>
           <a:p>
             <a:pPr>
-              <a:buFont typeface="Arial" panose="020B0604020202020204" pitchFamily="34" charset="0"/>
-              <a:buChar char="•"/>
+              <a:buFont typeface="Wingdings" panose="05000000000000000000" pitchFamily="2" charset="2"/>
+              <a:buChar char="ü"/>
             </a:pPr>
             <a:r>
-              <a:rPr lang="en-GB" dirty="0"/>
-              <a:t> </a:t>
-            </a:r>
-            <a:r>
-              <a:rPr lang="en-GB" dirty="0" err="1"/>
-              <a:t>Toivelista</a:t>
-            </a:r>
-            <a:endParaRPr lang="en-GB" dirty="0"/>
+              <a:rPr lang="fi-FI" dirty="0"/>
+              <a:t> Aikatauluhaku rajapinnasta</a:t>
+            </a:r>
           </a:p>
           <a:p>
             <a:pPr>
-              <a:buFont typeface="Arial" panose="020B0604020202020204" pitchFamily="34" charset="0"/>
-              <a:buChar char="•"/>
+              <a:buFont typeface="Wingdings" panose="05000000000000000000" pitchFamily="2" charset="2"/>
+              <a:buChar char="ü"/>
             </a:pPr>
             <a:r>
-              <a:rPr lang="en-GB" dirty="0"/>
-              <a:t> </a:t>
-            </a:r>
-            <a:r>
-              <a:rPr lang="en-GB" dirty="0" err="1"/>
-              <a:t>Työkalut</a:t>
-            </a:r>
-            <a:endParaRPr lang="en-GB" dirty="0"/>
+              <a:rPr lang="fi-FI" dirty="0"/>
+              <a:t> Tietojen esitys taulukossa</a:t>
+            </a:r>
+          </a:p>
+          <a:p>
+            <a:pPr>
+              <a:buFont typeface="Wingdings" panose="05000000000000000000" pitchFamily="2" charset="2"/>
+              <a:buChar char="ü"/>
+            </a:pPr>
+            <a:endParaRPr lang="fi-FI" dirty="0"/>
           </a:p>
         </p:txBody>
       </p:sp>
@@ -4228,7 +4145,7 @@
           <p:cNvPr id="5" name="Text Placeholder 4">
             <a:extLst>
               <a:ext uri="{FF2B5EF4-FFF2-40B4-BE49-F238E27FC236}">
-                <a16:creationId xmlns:a16="http://schemas.microsoft.com/office/drawing/2014/main" id="{3DC69EAA-50FE-44D7-BF4A-72517774517C}"/>
+                <a16:creationId xmlns:a16="http://schemas.microsoft.com/office/drawing/2014/main" id="{18AA7F29-44D2-41FC-9D1D-B31C139502FD}"/>
               </a:ext>
             </a:extLst>
           </p:cNvPr>
@@ -4245,18 +4162,10 @@
           <a:lstStyle/>
           <a:p>
             <a:r>
-              <a:rPr lang="en-GB" dirty="0" err="1"/>
-              <a:t>Projektin</a:t>
-            </a:r>
-            <a:r>
-              <a:rPr lang="en-GB" dirty="0"/>
-              <a:t> </a:t>
-            </a:r>
-            <a:r>
-              <a:rPr lang="en-GB" dirty="0" err="1"/>
-              <a:t>toteutus</a:t>
-            </a:r>
-            <a:endParaRPr lang="en-GB" dirty="0"/>
+              <a:rPr lang="en-GB" sz="2400" b="1" cap="none" dirty="0" err="1"/>
+              <a:t>Toivelista</a:t>
+            </a:r>
+            <a:endParaRPr lang="en-GB" b="1" dirty="0"/>
           </a:p>
         </p:txBody>
       </p:sp>
@@ -4265,7 +4174,7 @@
           <p:cNvPr id="6" name="Content Placeholder 5">
             <a:extLst>
               <a:ext uri="{FF2B5EF4-FFF2-40B4-BE49-F238E27FC236}">
-                <a16:creationId xmlns:a16="http://schemas.microsoft.com/office/drawing/2014/main" id="{1077BF08-532A-445E-890C-2D3CBE2616D0}"/>
+                <a16:creationId xmlns:a16="http://schemas.microsoft.com/office/drawing/2014/main" id="{6C9AE70D-03BB-4FD9-94F4-A7D4F5197EA0}"/>
               </a:ext>
             </a:extLst>
           </p:cNvPr>
@@ -4278,115 +4187,93 @@
         </p:nvSpPr>
         <p:spPr/>
         <p:txBody>
-          <a:bodyPr/>
+          <a:bodyPr>
+            <a:normAutofit lnSpcReduction="10000"/>
+          </a:bodyPr>
           <a:lstStyle/>
           <a:p>
             <a:pPr>
-              <a:buFont typeface="Arial" panose="020B0604020202020204" pitchFamily="34" charset="0"/>
-              <a:buChar char="•"/>
+              <a:buFont typeface="Wingdings" panose="05000000000000000000" pitchFamily="2" charset="2"/>
+              <a:buChar char="ü"/>
             </a:pPr>
             <a:r>
-              <a:rPr lang="en-GB" dirty="0"/>
-              <a:t> </a:t>
-            </a:r>
-            <a:r>
-              <a:rPr lang="en-GB" dirty="0" err="1"/>
-              <a:t>Tehtävien</a:t>
-            </a:r>
-            <a:r>
-              <a:rPr lang="en-GB" dirty="0"/>
-              <a:t> </a:t>
-            </a:r>
-            <a:r>
-              <a:rPr lang="en-GB" dirty="0" err="1"/>
-              <a:t>paloittelu</a:t>
-            </a:r>
-            <a:endParaRPr lang="en-GB" dirty="0"/>
-          </a:p>
-          <a:p>
-            <a:pPr lvl="1">
-              <a:buFont typeface="Arial" panose="020B0604020202020204" pitchFamily="34" charset="0"/>
-              <a:buChar char="•"/>
+              <a:rPr lang="fi-FI" dirty="0"/>
+              <a:t> Aikataulumuutosten esitys</a:t>
+            </a:r>
+          </a:p>
+          <a:p>
+            <a:pPr>
+              <a:buFont typeface="Wingdings" panose="05000000000000000000" pitchFamily="2" charset="2"/>
+              <a:buChar char="ü"/>
             </a:pPr>
             <a:r>
-              <a:rPr lang="en-GB" dirty="0" err="1"/>
-              <a:t>Minimivaatimusten</a:t>
-            </a:r>
-            <a:r>
-              <a:rPr lang="en-GB" dirty="0"/>
-              <a:t> </a:t>
-            </a:r>
-            <a:r>
-              <a:rPr lang="en-GB" dirty="0" err="1"/>
-              <a:t>toteutus</a:t>
-            </a:r>
-            <a:r>
-              <a:rPr lang="en-GB" dirty="0"/>
-              <a:t> </a:t>
-            </a:r>
-            <a:r>
-              <a:rPr lang="en-GB" dirty="0" err="1"/>
-              <a:t>ensin</a:t>
-            </a:r>
-            <a:endParaRPr lang="en-GB" dirty="0"/>
+              <a:rPr lang="fi-FI" dirty="0"/>
+              <a:t> Sovellus ehdottaa asema-kenttiin asemia (autocomplete)</a:t>
+            </a:r>
           </a:p>
           <a:p>
             <a:pPr>
-              <a:buFont typeface="Arial" panose="020B0604020202020204" pitchFamily="34" charset="0"/>
-              <a:buChar char="•"/>
+              <a:buFont typeface="Wingdings" panose="05000000000000000000" pitchFamily="2" charset="2"/>
+              <a:buChar char="ü"/>
             </a:pPr>
             <a:r>
-              <a:rPr lang="en-GB" dirty="0"/>
-              <a:t> Git</a:t>
-            </a:r>
-          </a:p>
-          <a:p>
-            <a:pPr lvl="1">
-              <a:buFont typeface="Arial" panose="020B0604020202020204" pitchFamily="34" charset="0"/>
-              <a:buChar char="•"/>
+              <a:rPr lang="fi-FI" dirty="0"/>
+              <a:t> Lähimmän aseman haku GPS-paikannuksella</a:t>
+            </a:r>
+          </a:p>
+          <a:p>
+            <a:pPr>
+              <a:buFont typeface="Wingdings" panose="05000000000000000000" pitchFamily="2" charset="2"/>
+              <a:buChar char="q"/>
             </a:pPr>
             <a:r>
-              <a:rPr lang="en-GB" dirty="0" err="1"/>
-              <a:t>Branchit</a:t>
-            </a:r>
-            <a:endParaRPr lang="en-GB" dirty="0"/>
+              <a:rPr lang="fi-FI" dirty="0"/>
+              <a:t> Omien reittien tallentaminen</a:t>
+            </a:r>
           </a:p>
           <a:p>
             <a:pPr>
-              <a:buFont typeface="Arial" panose="020B0604020202020204" pitchFamily="34" charset="0"/>
-              <a:buChar char="•"/>
+              <a:buFont typeface="Wingdings" panose="05000000000000000000" pitchFamily="2" charset="2"/>
+              <a:buChar char="q"/>
             </a:pPr>
             <a:r>
-              <a:rPr lang="en-GB" dirty="0"/>
-              <a:t> </a:t>
-            </a:r>
-            <a:r>
-              <a:rPr lang="en-GB" dirty="0" err="1"/>
-              <a:t>Palaverit</a:t>
-            </a:r>
-            <a:endParaRPr lang="en-GB" dirty="0"/>
+              <a:rPr lang="fi-FI" dirty="0"/>
+              <a:t> iOS-julkaisu</a:t>
+            </a:r>
           </a:p>
           <a:p>
             <a:pPr>
-              <a:buFont typeface="Arial" panose="020B0604020202020204" pitchFamily="34" charset="0"/>
-              <a:buChar char="•"/>
+              <a:buFont typeface="Wingdings" panose="05000000000000000000" pitchFamily="2" charset="2"/>
+              <a:buChar char="q"/>
             </a:pPr>
             <a:r>
-              <a:rPr lang="en-GB" dirty="0"/>
-              <a:t> </a:t>
-            </a:r>
-            <a:r>
-              <a:rPr lang="en-GB" dirty="0" err="1"/>
-              <a:t>Testaus</a:t>
-            </a:r>
-            <a:endParaRPr lang="en-GB" dirty="0"/>
+              <a:rPr lang="fi-FI" dirty="0"/>
+              <a:t> Toimintanopeuden optimointi </a:t>
+            </a:r>
+          </a:p>
+          <a:p>
+            <a:pPr>
+              <a:buFont typeface="Wingdings" panose="05000000000000000000" pitchFamily="2" charset="2"/>
+              <a:buChar char="q"/>
+            </a:pPr>
+            <a:r>
+              <a:rPr lang="fi-FI" dirty="0"/>
+              <a:t> Ohjelmakoodin siistiminen</a:t>
+            </a:r>
+          </a:p>
+          <a:p>
+            <a:pPr>
+              <a:buFont typeface="Wingdings" panose="05000000000000000000" pitchFamily="2" charset="2"/>
+              <a:buChar char="q"/>
+            </a:pPr>
+            <a:endParaRPr lang="fi-FI" dirty="0"/>
           </a:p>
         </p:txBody>
       </p:sp>
     </p:spTree>
     <p:extLst>
       <p:ext uri="{BB962C8B-B14F-4D97-AF65-F5344CB8AC3E}">
-        <p14:creationId xmlns:p14="http://schemas.microsoft.com/office/powerpoint/2010/main" val="2381736256"/>
+        <p14:creationId xmlns:p14="http://schemas.microsoft.com/office/powerpoint/2010/main" val="666523930"/>
       </p:ext>
     </p:extLst>
   </p:cSld>
@@ -4418,7 +4305,7 @@
           <p:cNvPr id="2" name="Title 1">
             <a:extLst>
               <a:ext uri="{FF2B5EF4-FFF2-40B4-BE49-F238E27FC236}">
-                <a16:creationId xmlns:a16="http://schemas.microsoft.com/office/drawing/2014/main" id="{E27CEA1B-078C-430D-844A-B0FBB7B6D4D8}"/>
+                <a16:creationId xmlns:a16="http://schemas.microsoft.com/office/drawing/2014/main" id="{AD10D188-D805-4295-AAE2-3C6E1011C4D8}"/>
               </a:ext>
             </a:extLst>
           </p:cNvPr>
@@ -4436,7 +4323,7 @@
           <a:p>
             <a:r>
               <a:rPr lang="en-GB" dirty="0" err="1"/>
-              <a:t>Haasteet</a:t>
+              <a:t>Työvaiheet</a:t>
             </a:r>
             <a:endParaRPr lang="en-GB" dirty="0"/>
           </a:p>
@@ -4444,10 +4331,10 @@
       </p:sp>
       <p:sp>
         <p:nvSpPr>
-          <p:cNvPr id="3" name="Content Placeholder 2">
+          <p:cNvPr id="3" name="Text Placeholder 2">
             <a:extLst>
               <a:ext uri="{FF2B5EF4-FFF2-40B4-BE49-F238E27FC236}">
-                <a16:creationId xmlns:a16="http://schemas.microsoft.com/office/drawing/2014/main" id="{429AF9E2-E5D5-43FC-99C4-3765355498A6}"/>
+                <a16:creationId xmlns:a16="http://schemas.microsoft.com/office/drawing/2014/main" id="{CAB03B0F-B9D2-4EF3-AFBB-D36EDE59760C}"/>
               </a:ext>
             </a:extLst>
           </p:cNvPr>
@@ -4455,75 +4342,157 @@
             <a:spLocks noGrp="1"/>
           </p:cNvSpPr>
           <p:nvPr>
-            <p:ph idx="1"/>
+            <p:ph type="body" idx="1"/>
           </p:nvPr>
         </p:nvSpPr>
         <p:spPr/>
         <p:txBody>
-          <a:bodyPr/>
-          <a:lstStyle/>
-          <a:p>
-            <a:r>
-              <a:rPr lang="en-GB" dirty="0" err="1"/>
-              <a:t>Kehärata</a:t>
-            </a:r>
-            <a:endParaRPr lang="en-GB" dirty="0"/>
-          </a:p>
-          <a:p>
-            <a:pPr lvl="1"/>
-            <a:r>
-              <a:rPr lang="en-GB" dirty="0" err="1"/>
-              <a:t>Matka-aikojen</a:t>
-            </a:r>
+          <a:bodyPr>
+            <a:normAutofit/>
+          </a:bodyPr>
+          <a:lstStyle/>
+          <a:p>
+            <a:r>
+              <a:rPr lang="en-GB" sz="2400" b="1" cap="none" dirty="0" err="1"/>
+              <a:t>Suunnittelu</a:t>
+            </a:r>
+            <a:endParaRPr lang="en-GB" sz="2400" b="1" cap="none" dirty="0"/>
+          </a:p>
+        </p:txBody>
+      </p:sp>
+      <p:sp>
+        <p:nvSpPr>
+          <p:cNvPr id="4" name="Content Placeholder 3">
+            <a:extLst>
+              <a:ext uri="{FF2B5EF4-FFF2-40B4-BE49-F238E27FC236}">
+                <a16:creationId xmlns:a16="http://schemas.microsoft.com/office/drawing/2014/main" id="{AF72CB90-AB65-4805-8399-DB3AF7D65BFF}"/>
+              </a:ext>
+            </a:extLst>
+          </p:cNvPr>
+          <p:cNvSpPr>
+            <a:spLocks noGrp="1"/>
+          </p:cNvSpPr>
+          <p:nvPr>
+            <p:ph sz="half" idx="2"/>
+          </p:nvPr>
+        </p:nvSpPr>
+        <p:spPr/>
+        <p:txBody>
+          <a:bodyPr/>
+          <a:lstStyle/>
+          <a:p>
+            <a:pPr>
+              <a:buFont typeface="Arial" panose="020B0604020202020204" pitchFamily="34" charset="0"/>
+              <a:buChar char="•"/>
+            </a:pPr>
+            <a:r>
+              <a:rPr lang="en-GB" dirty="0"/>
+              <a:t> MVP</a:t>
+            </a:r>
+          </a:p>
+          <a:p>
+            <a:pPr>
+              <a:buFont typeface="Arial" panose="020B0604020202020204" pitchFamily="34" charset="0"/>
+              <a:buChar char="•"/>
+            </a:pPr>
             <a:r>
               <a:rPr lang="en-GB" dirty="0"/>
               <a:t> </a:t>
             </a:r>
             <a:r>
               <a:rPr lang="en-GB" dirty="0" err="1"/>
-              <a:t>rationaalisuus</a:t>
+              <a:t>Toivelista</a:t>
             </a:r>
             <a:endParaRPr lang="en-GB" dirty="0"/>
           </a:p>
           <a:p>
-            <a:pPr lvl="1"/>
-            <a:r>
-              <a:rPr lang="en-GB" dirty="0" err="1"/>
-              <a:t>Myöhästyneiden</a:t>
-            </a:r>
+            <a:pPr>
+              <a:buFont typeface="Arial" panose="020B0604020202020204" pitchFamily="34" charset="0"/>
+              <a:buChar char="•"/>
+            </a:pPr>
             <a:r>
               <a:rPr lang="en-GB" dirty="0"/>
               <a:t> </a:t>
             </a:r>
             <a:r>
               <a:rPr lang="en-GB" dirty="0" err="1"/>
-              <a:t>tiedot</a:t>
-            </a:r>
-            <a:br>
-              <a:rPr lang="en-GB" dirty="0"/>
-            </a:br>
+              <a:t>Työkalut</a:t>
+            </a:r>
             <a:endParaRPr lang="en-GB" dirty="0"/>
           </a:p>
-          <a:p>
-            <a:r>
-              <a:rPr lang="en-GB" dirty="0" err="1"/>
-              <a:t>Paikannus</a:t>
-            </a:r>
-            <a:endParaRPr lang="en-GB" dirty="0"/>
-          </a:p>
-          <a:p>
-            <a:pPr lvl="1"/>
-            <a:r>
-              <a:rPr lang="en-GB" dirty="0" err="1"/>
-              <a:t>Erot</a:t>
-            </a:r>
+        </p:txBody>
+      </p:sp>
+      <p:sp>
+        <p:nvSpPr>
+          <p:cNvPr id="5" name="Text Placeholder 4">
+            <a:extLst>
+              <a:ext uri="{FF2B5EF4-FFF2-40B4-BE49-F238E27FC236}">
+                <a16:creationId xmlns:a16="http://schemas.microsoft.com/office/drawing/2014/main" id="{3DC69EAA-50FE-44D7-BF4A-72517774517C}"/>
+              </a:ext>
+            </a:extLst>
+          </p:cNvPr>
+          <p:cNvSpPr>
+            <a:spLocks noGrp="1"/>
+          </p:cNvSpPr>
+          <p:nvPr>
+            <p:ph type="body" sz="quarter" idx="3"/>
+          </p:nvPr>
+        </p:nvSpPr>
+        <p:spPr/>
+        <p:txBody>
+          <a:bodyPr>
+            <a:normAutofit/>
+          </a:bodyPr>
+          <a:lstStyle/>
+          <a:p>
+            <a:r>
+              <a:rPr lang="en-GB" sz="2400" b="1" cap="none" dirty="0" err="1"/>
+              <a:t>Projektin</a:t>
+            </a:r>
+            <a:r>
+              <a:rPr lang="en-GB" sz="2400" b="1" cap="none" dirty="0"/>
+              <a:t> </a:t>
+            </a:r>
+            <a:r>
+              <a:rPr lang="en-GB" sz="2400" b="1" cap="none" dirty="0" err="1"/>
+              <a:t>toteutus</a:t>
+            </a:r>
+            <a:endParaRPr lang="en-GB" sz="2400" b="1" cap="none" dirty="0"/>
+          </a:p>
+        </p:txBody>
+      </p:sp>
+      <p:sp>
+        <p:nvSpPr>
+          <p:cNvPr id="6" name="Content Placeholder 5">
+            <a:extLst>
+              <a:ext uri="{FF2B5EF4-FFF2-40B4-BE49-F238E27FC236}">
+                <a16:creationId xmlns:a16="http://schemas.microsoft.com/office/drawing/2014/main" id="{1077BF08-532A-445E-890C-2D3CBE2616D0}"/>
+              </a:ext>
+            </a:extLst>
+          </p:cNvPr>
+          <p:cNvSpPr>
+            <a:spLocks noGrp="1"/>
+          </p:cNvSpPr>
+          <p:nvPr>
+            <p:ph sz="quarter" idx="4"/>
+          </p:nvPr>
+        </p:nvSpPr>
+        <p:spPr/>
+        <p:txBody>
+          <a:bodyPr/>
+          <a:lstStyle/>
+          <a:p>
+            <a:pPr>
+              <a:buFont typeface="Arial" panose="020B0604020202020204" pitchFamily="34" charset="0"/>
+              <a:buChar char="•"/>
+            </a:pPr>
             <a:r>
               <a:rPr lang="en-GB" dirty="0"/>
               <a:t> </a:t>
             </a:r>
             <a:r>
               <a:rPr lang="en-GB" dirty="0" err="1"/>
-              <a:t>puhelinmallien</a:t>
+              <a:t>Tehtävien</a:t>
             </a:r>
             <a:r>
               <a:rPr lang="en-GB" dirty="0"/>
@@ -4531,34 +4500,94 @@
             </a:r>
             <a:r>
               <a:rPr lang="en-GB" dirty="0" err="1"/>
-              <a:t>yhteensopivuudessa</a:t>
+              <a:t>paloittelu</a:t>
             </a:r>
             <a:endParaRPr lang="en-GB" dirty="0"/>
           </a:p>
           <a:p>
-            <a:pPr lvl="1"/>
+            <a:pPr lvl="1">
+              <a:buFont typeface="Arial" panose="020B0604020202020204" pitchFamily="34" charset="0"/>
+              <a:buChar char="•"/>
+            </a:pPr>
+            <a:r>
+              <a:rPr lang="en-GB" dirty="0" err="1"/>
+              <a:t>Minimivaatimusten</a:t>
+            </a:r>
+            <a:r>
+              <a:rPr lang="en-GB" dirty="0"/>
+              <a:t> </a:t>
+            </a:r>
+            <a:r>
+              <a:rPr lang="en-GB" dirty="0" err="1"/>
+              <a:t>toteutus</a:t>
+            </a:r>
+            <a:r>
+              <a:rPr lang="en-GB" dirty="0"/>
+              <a:t> </a:t>
+            </a:r>
+            <a:r>
+              <a:rPr lang="en-GB" dirty="0" err="1"/>
+              <a:t>ensin</a:t>
+            </a:r>
             <a:endParaRPr lang="en-GB" dirty="0"/>
           </a:p>
           <a:p>
+            <a:pPr>
+              <a:buFont typeface="Arial" panose="020B0604020202020204" pitchFamily="34" charset="0"/>
+              <a:buChar char="•"/>
+            </a:pPr>
+            <a:r>
+              <a:rPr lang="en-GB" dirty="0"/>
+              <a:t> Git</a:t>
+            </a:r>
+          </a:p>
+          <a:p>
+            <a:pPr lvl="1">
+              <a:buFont typeface="Arial" panose="020B0604020202020204" pitchFamily="34" charset="0"/>
+              <a:buChar char="•"/>
+            </a:pPr>
             <a:r>
               <a:rPr lang="en-GB" dirty="0" err="1"/>
-              <a:t>Yhteensopivuus</a:t>
+              <a:t>Branchit</a:t>
             </a:r>
             <a:endParaRPr lang="en-GB" dirty="0"/>
           </a:p>
           <a:p>
-            <a:pPr lvl="1"/>
+            <a:pPr>
+              <a:buFont typeface="Arial" panose="020B0604020202020204" pitchFamily="34" charset="0"/>
+              <a:buChar char="•"/>
+            </a:pPr>
             <a:r>
               <a:rPr lang="en-GB" dirty="0"/>
-              <a:t>Android, iOS</a:t>
-            </a:r>
+              <a:t> </a:t>
+            </a:r>
+            <a:r>
+              <a:rPr lang="en-GB" dirty="0" err="1"/>
+              <a:t>Palaverit</a:t>
+            </a:r>
+            <a:endParaRPr lang="en-GB" dirty="0"/>
+          </a:p>
+          <a:p>
+            <a:pPr>
+              <a:buFont typeface="Arial" panose="020B0604020202020204" pitchFamily="34" charset="0"/>
+              <a:buChar char="•"/>
+            </a:pPr>
+            <a:r>
+              <a:rPr lang="en-GB" dirty="0"/>
+              <a:t> </a:t>
+            </a:r>
+            <a:r>
+              <a:rPr lang="en-GB" dirty="0" err="1"/>
+              <a:t>Testaus</a:t>
+            </a:r>
+            <a:endParaRPr lang="en-GB" dirty="0"/>
           </a:p>
         </p:txBody>
       </p:sp>
     </p:spTree>
     <p:extLst>
       <p:ext uri="{BB962C8B-B14F-4D97-AF65-F5344CB8AC3E}">
-        <p14:creationId xmlns:p14="http://schemas.microsoft.com/office/powerpoint/2010/main" val="3515949779"/>
+        <p14:creationId xmlns:p14="http://schemas.microsoft.com/office/powerpoint/2010/main" val="2381736256"/>
       </p:ext>
     </p:extLst>
   </p:cSld>
@@ -4587,6 +4616,178 @@
       </p:grpSpPr>
       <p:sp>
         <p:nvSpPr>
+          <p:cNvPr id="2" name="Title 1">
+            <a:extLst>
+              <a:ext uri="{FF2B5EF4-FFF2-40B4-BE49-F238E27FC236}">
+                <a16:creationId xmlns:a16="http://schemas.microsoft.com/office/drawing/2014/main" id="{E27CEA1B-078C-430D-844A-B0FBB7B6D4D8}"/>
+              </a:ext>
+            </a:extLst>
+          </p:cNvPr>
+          <p:cNvSpPr>
+            <a:spLocks noGrp="1"/>
+          </p:cNvSpPr>
+          <p:nvPr>
+            <p:ph type="title"/>
+          </p:nvPr>
+        </p:nvSpPr>
+        <p:spPr/>
+        <p:txBody>
+          <a:bodyPr/>
+          <a:lstStyle/>
+          <a:p>
+            <a:r>
+              <a:rPr lang="en-GB" dirty="0" err="1"/>
+              <a:t>Haasteet</a:t>
+            </a:r>
+            <a:endParaRPr lang="en-GB" dirty="0"/>
+          </a:p>
+        </p:txBody>
+      </p:sp>
+      <p:sp>
+        <p:nvSpPr>
+          <p:cNvPr id="3" name="Content Placeholder 2">
+            <a:extLst>
+              <a:ext uri="{FF2B5EF4-FFF2-40B4-BE49-F238E27FC236}">
+                <a16:creationId xmlns:a16="http://schemas.microsoft.com/office/drawing/2014/main" id="{429AF9E2-E5D5-43FC-99C4-3765355498A6}"/>
+              </a:ext>
+            </a:extLst>
+          </p:cNvPr>
+          <p:cNvSpPr>
+            <a:spLocks noGrp="1"/>
+          </p:cNvSpPr>
+          <p:nvPr>
+            <p:ph idx="1"/>
+          </p:nvPr>
+        </p:nvSpPr>
+        <p:spPr/>
+        <p:txBody>
+          <a:bodyPr/>
+          <a:lstStyle/>
+          <a:p>
+            <a:r>
+              <a:rPr lang="en-GB" dirty="0" err="1"/>
+              <a:t>Kehärata</a:t>
+            </a:r>
+            <a:endParaRPr lang="en-GB" dirty="0"/>
+          </a:p>
+          <a:p>
+            <a:pPr lvl="1"/>
+            <a:r>
+              <a:rPr lang="en-GB" dirty="0" err="1"/>
+              <a:t>Matka-aikojen</a:t>
+            </a:r>
+            <a:r>
+              <a:rPr lang="en-GB" dirty="0"/>
+              <a:t> </a:t>
+            </a:r>
+            <a:r>
+              <a:rPr lang="en-GB" dirty="0" err="1"/>
+              <a:t>rationaalisuus</a:t>
+            </a:r>
+            <a:endParaRPr lang="en-GB" dirty="0"/>
+          </a:p>
+          <a:p>
+            <a:pPr lvl="1"/>
+            <a:r>
+              <a:rPr lang="en-GB" dirty="0" err="1"/>
+              <a:t>Myöhästyneiden</a:t>
+            </a:r>
+            <a:r>
+              <a:rPr lang="en-GB" dirty="0"/>
+              <a:t> </a:t>
+            </a:r>
+            <a:r>
+              <a:rPr lang="en-GB" dirty="0" err="1"/>
+              <a:t>tiedot</a:t>
+            </a:r>
+            <a:br>
+              <a:rPr lang="en-GB" dirty="0"/>
+            </a:br>
+            <a:endParaRPr lang="en-GB" dirty="0"/>
+          </a:p>
+          <a:p>
+            <a:r>
+              <a:rPr lang="en-GB" dirty="0" err="1"/>
+              <a:t>Paikannus</a:t>
+            </a:r>
+            <a:endParaRPr lang="en-GB" dirty="0"/>
+          </a:p>
+          <a:p>
+            <a:pPr lvl="1"/>
+            <a:r>
+              <a:rPr lang="en-GB" dirty="0" err="1"/>
+              <a:t>Erot</a:t>
+            </a:r>
+            <a:r>
+              <a:rPr lang="en-GB" dirty="0"/>
+              <a:t> </a:t>
+            </a:r>
+            <a:r>
+              <a:rPr lang="en-GB" dirty="0" err="1"/>
+              <a:t>puhelinmallien</a:t>
+            </a:r>
+            <a:r>
+              <a:rPr lang="en-GB" dirty="0"/>
+              <a:t> </a:t>
+            </a:r>
+            <a:r>
+              <a:rPr lang="en-GB" dirty="0" err="1"/>
+              <a:t>yhteensopivuudessa</a:t>
+            </a:r>
+            <a:endParaRPr lang="en-GB" dirty="0"/>
+          </a:p>
+          <a:p>
+            <a:pPr lvl="1"/>
+            <a:endParaRPr lang="en-GB" dirty="0"/>
+          </a:p>
+          <a:p>
+            <a:r>
+              <a:rPr lang="en-GB" dirty="0" err="1"/>
+              <a:t>Yhteensopivuus</a:t>
+            </a:r>
+            <a:endParaRPr lang="en-GB" dirty="0"/>
+          </a:p>
+          <a:p>
+            <a:pPr lvl="1"/>
+            <a:r>
+              <a:rPr lang="en-GB" dirty="0"/>
+              <a:t>Android, iOS</a:t>
+            </a:r>
+          </a:p>
+        </p:txBody>
+      </p:sp>
+    </p:spTree>
+    <p:extLst>
+      <p:ext uri="{BB962C8B-B14F-4D97-AF65-F5344CB8AC3E}">
+        <p14:creationId xmlns:p14="http://schemas.microsoft.com/office/powerpoint/2010/main" val="3515949779"/>
+      </p:ext>
+    </p:extLst>
+  </p:cSld>
+  <p:clrMapOvr>
+    <a:masterClrMapping/>
+  </p:clrMapOvr>
+</p:sld>
+</file>
+
+<file path=ppt/slides/slide6.xml><?xml version="1.0" encoding="utf-8"?>
+<p:sld xmlns:a="http://schemas.openxmlformats.org/drawingml/2006/main" xmlns:r="http://schemas.openxmlformats.org/officeDocument/2006/relationships" xmlns:p="http://schemas.openxmlformats.org/presentationml/2006/main">
+  <p:cSld>
+    <p:spTree>
+      <p:nvGrpSpPr>
+        <p:cNvPr id="1" name=""/>
+        <p:cNvGrpSpPr/>
+        <p:nvPr/>
+      </p:nvGrpSpPr>
+      <p:grpSpPr>
+        <a:xfrm>
+          <a:off x="0" y="0"/>
+          <a:ext cx="0" cy="0"/>
+          <a:chOff x="0" y="0"/>
+          <a:chExt cx="0" cy="0"/>
+        </a:xfrm>
+      </p:grpSpPr>
+      <p:sp>
+        <p:nvSpPr>
           <p:cNvPr id="2" name="Otsikko 1">
             <a:extLst>
               <a:ext uri="{FF2B5EF4-FFF2-40B4-BE49-F238E27FC236}">
@@ -4639,33 +4840,85 @@
             <a:pPr marL="457200" indent="-457200"/>
             <a:r>
               <a:rPr lang="fi-FI" dirty="0"/>
-              <a:t>Lähdekoodi gitistä: </a:t>
+              <a:t>Julkaistu Play </a:t>
+            </a:r>
+            <a:r>
+              <a:rPr lang="fi-FI" dirty="0" err="1"/>
+              <a:t>Storessa</a:t>
+            </a:r>
+            <a:r>
+              <a:rPr lang="fi-FI" dirty="0"/>
+              <a:t>: </a:t>
             </a:r>
             <a:r>
               <a:rPr lang="fi-FI" dirty="0">
                 <a:hlinkClick r:id="rId2"/>
               </a:rPr>
-              <a:t>http://github.com/suunta</a:t>
-            </a:r>
+              <a:t>https://play.google.com/store/apps/details?id=com.junareitti</a:t>
+            </a:r>
+            <a:endParaRPr lang="fi-FI" dirty="0"/>
+          </a:p>
+          <a:p>
+            <a:pPr marL="457200" indent="-457200"/>
+            <a:r>
+              <a:rPr lang="fi-FI" dirty="0"/>
+              <a:t>Lähdekoodi gitistä: </a:t>
+            </a:r>
+            <a:r>
+              <a:rPr lang="fi-FI" dirty="0">
+                <a:hlinkClick r:id="rId3"/>
+              </a:rPr>
+              <a:t>https://github.com/suunta/suunta</a:t>
+            </a:r>
+            <a:endParaRPr lang="fi-FI" dirty="0"/>
+          </a:p>
+          <a:p>
+            <a:pPr marL="0" indent="0">
+              <a:buNone/>
+            </a:pPr>
             <a:br>
               <a:rPr lang="fi-FI" dirty="0"/>
             </a:br>
             <a:endParaRPr lang="fi-FI" dirty="0"/>
           </a:p>
           <a:p>
-            <a:pPr marL="457200" indent="-457200"/>
-            <a:r>
-              <a:rPr lang="fi-FI"/>
-              <a:t>Kysymyksiä?</a:t>
-            </a:r>
+            <a:pPr marL="0" indent="0">
+              <a:buNone/>
+            </a:pPr>
             <a:endParaRPr lang="fi-FI" dirty="0"/>
           </a:p>
-          <a:p>
-            <a:pPr marL="457200" indent="-457200"/>
-            <a:endParaRPr lang="fi-FI" dirty="0"/>
-          </a:p>
-        </p:txBody>
-      </p:sp>
+        </p:txBody>
+      </p:sp>
+      <p:pic>
+        <p:nvPicPr>
+          <p:cNvPr id="4" name="Kuva 3">
+            <a:extLst>
+              <a:ext uri="{FF2B5EF4-FFF2-40B4-BE49-F238E27FC236}">
+                <a16:creationId xmlns:a16="http://schemas.microsoft.com/office/drawing/2014/main" id="{E91EA28D-2760-4B9B-AED2-CD88B50C3167}"/>
+              </a:ext>
+            </a:extLst>
+          </p:cNvPr>
+          <p:cNvPicPr>
+            <a:picLocks noChangeAspect="1"/>
+          </p:cNvPicPr>
+          <p:nvPr/>
+        </p:nvPicPr>
+        <p:blipFill>
+          <a:blip r:embed="rId4"/>
+          <a:stretch>
+            <a:fillRect/>
+          </a:stretch>
+        </p:blipFill>
+        <p:spPr>
+          <a:xfrm>
+            <a:off x="1289786" y="3271344"/>
+            <a:ext cx="2591351" cy="2597750"/>
+          </a:xfrm>
+          <a:prstGeom prst="rect">
+            <a:avLst/>
+          </a:prstGeom>
+        </p:spPr>
+      </p:pic>
     </p:spTree>
     <p:extLst>
       <p:ext uri="{BB962C8B-B14F-4D97-AF65-F5344CB8AC3E}">

</xml_diff>